<commit_message>
update Rapport and Présentation
</commit_message>
<xml_diff>
--- a/Présentation.pptx
+++ b/Présentation.pptx
@@ -6339,7 +6339,7 @@
                 <a:ea typeface="Calibri" panose="020F0502020204030204" pitchFamily="34" charset="0"/>
                 <a:cs typeface="Arial" panose="020B0604020202020204" pitchFamily="34" charset="0"/>
               </a:rPr>
-              <a:t>- </a:t>
+              <a:t>- Prof. </a:t>
             </a:r>
             <a:r>
               <a:rPr lang="fr-FR" sz="1200" kern="100" dirty="0" err="1">
@@ -6371,24 +6371,21 @@
                 <a:ea typeface="Calibri" panose="020F0502020204030204" pitchFamily="34" charset="0"/>
                 <a:cs typeface="Arial" panose="020B0604020202020204" pitchFamily="34" charset="0"/>
               </a:rPr>
-              <a:t>- </a:t>
+              <a:t>- Prof. </a:t>
             </a:r>
             <a:r>
-              <a:rPr lang="fr-FR" sz="1200" kern="100" dirty="0" err="1">
+              <a:rPr lang="fr-FR" sz="1200" kern="100">
                 <a:latin typeface="Times New Roman" panose="02020603050405020304" pitchFamily="18" charset="0"/>
                 <a:ea typeface="Calibri" panose="020F0502020204030204" pitchFamily="34" charset="0"/>
                 <a:cs typeface="Arial" panose="020B0604020202020204" pitchFamily="34" charset="0"/>
               </a:rPr>
-              <a:t>Anejjar</a:t>
+              <a:t>Anejja</a:t>
             </a:r>
-            <a:r>
-              <a:rPr lang="fr-FR" sz="1200" kern="100" dirty="0">
-                <a:latin typeface="Times New Roman" panose="02020603050405020304" pitchFamily="18" charset="0"/>
-                <a:ea typeface="Calibri" panose="020F0502020204030204" pitchFamily="34" charset="0"/>
-                <a:cs typeface="Arial" panose="020B0604020202020204" pitchFamily="34" charset="0"/>
-              </a:rPr>
-              <a:t> Khadija</a:t>
-            </a:r>
+            <a:endParaRPr lang="fr-FR" sz="1200" kern="100" dirty="0">
+              <a:latin typeface="Times New Roman" panose="02020603050405020304" pitchFamily="18" charset="0"/>
+              <a:ea typeface="Calibri" panose="020F0502020204030204" pitchFamily="34" charset="0"/>
+              <a:cs typeface="Arial" panose="020B0604020202020204" pitchFamily="34" charset="0"/>
+            </a:endParaRPr>
           </a:p>
         </p:txBody>
       </p:sp>

</xml_diff>